<commit_message>
a few things from marina
</commit_message>
<xml_diff>
--- a/figs/system/DOF.pptx
+++ b/figs/system/DOF.pptx
@@ -243,7 +243,7 @@
           <a:p>
             <a:fld id="{67760EAC-A49B-4DCF-9D84-3BBA27200B5E}" type="datetimeFigureOut">
               <a:rPr lang="en-US" smtClean="0"/>
-              <a:t>2/15/2025</a:t>
+              <a:t>2/23/2025</a:t>
             </a:fld>
             <a:endParaRPr lang="en-US"/>
           </a:p>
@@ -413,7 +413,7 @@
           <a:p>
             <a:fld id="{67760EAC-A49B-4DCF-9D84-3BBA27200B5E}" type="datetimeFigureOut">
               <a:rPr lang="en-US" smtClean="0"/>
-              <a:t>2/15/2025</a:t>
+              <a:t>2/23/2025</a:t>
             </a:fld>
             <a:endParaRPr lang="en-US"/>
           </a:p>
@@ -593,7 +593,7 @@
           <a:p>
             <a:fld id="{67760EAC-A49B-4DCF-9D84-3BBA27200B5E}" type="datetimeFigureOut">
               <a:rPr lang="en-US" smtClean="0"/>
-              <a:t>2/15/2025</a:t>
+              <a:t>2/23/2025</a:t>
             </a:fld>
             <a:endParaRPr lang="en-US"/>
           </a:p>
@@ -763,7 +763,7 @@
           <a:p>
             <a:fld id="{67760EAC-A49B-4DCF-9D84-3BBA27200B5E}" type="datetimeFigureOut">
               <a:rPr lang="en-US" smtClean="0"/>
-              <a:t>2/15/2025</a:t>
+              <a:t>2/23/2025</a:t>
             </a:fld>
             <a:endParaRPr lang="en-US"/>
           </a:p>
@@ -1009,7 +1009,7 @@
           <a:p>
             <a:fld id="{67760EAC-A49B-4DCF-9D84-3BBA27200B5E}" type="datetimeFigureOut">
               <a:rPr lang="en-US" smtClean="0"/>
-              <a:t>2/15/2025</a:t>
+              <a:t>2/23/2025</a:t>
             </a:fld>
             <a:endParaRPr lang="en-US"/>
           </a:p>
@@ -1241,7 +1241,7 @@
           <a:p>
             <a:fld id="{67760EAC-A49B-4DCF-9D84-3BBA27200B5E}" type="datetimeFigureOut">
               <a:rPr lang="en-US" smtClean="0"/>
-              <a:t>2/15/2025</a:t>
+              <a:t>2/23/2025</a:t>
             </a:fld>
             <a:endParaRPr lang="en-US"/>
           </a:p>
@@ -1608,7 +1608,7 @@
           <a:p>
             <a:fld id="{67760EAC-A49B-4DCF-9D84-3BBA27200B5E}" type="datetimeFigureOut">
               <a:rPr lang="en-US" smtClean="0"/>
-              <a:t>2/15/2025</a:t>
+              <a:t>2/23/2025</a:t>
             </a:fld>
             <a:endParaRPr lang="en-US"/>
           </a:p>
@@ -1726,7 +1726,7 @@
           <a:p>
             <a:fld id="{67760EAC-A49B-4DCF-9D84-3BBA27200B5E}" type="datetimeFigureOut">
               <a:rPr lang="en-US" smtClean="0"/>
-              <a:t>2/15/2025</a:t>
+              <a:t>2/23/2025</a:t>
             </a:fld>
             <a:endParaRPr lang="en-US"/>
           </a:p>
@@ -1821,7 +1821,7 @@
           <a:p>
             <a:fld id="{67760EAC-A49B-4DCF-9D84-3BBA27200B5E}" type="datetimeFigureOut">
               <a:rPr lang="en-US" smtClean="0"/>
-              <a:t>2/15/2025</a:t>
+              <a:t>2/23/2025</a:t>
             </a:fld>
             <a:endParaRPr lang="en-US"/>
           </a:p>
@@ -2098,7 +2098,7 @@
           <a:p>
             <a:fld id="{67760EAC-A49B-4DCF-9D84-3BBA27200B5E}" type="datetimeFigureOut">
               <a:rPr lang="en-US" smtClean="0"/>
-              <a:t>2/15/2025</a:t>
+              <a:t>2/23/2025</a:t>
             </a:fld>
             <a:endParaRPr lang="en-US"/>
           </a:p>
@@ -2355,7 +2355,7 @@
           <a:p>
             <a:fld id="{67760EAC-A49B-4DCF-9D84-3BBA27200B5E}" type="datetimeFigureOut">
               <a:rPr lang="en-US" smtClean="0"/>
-              <a:t>2/15/2025</a:t>
+              <a:t>2/23/2025</a:t>
             </a:fld>
             <a:endParaRPr lang="en-US"/>
           </a:p>
@@ -2568,7 +2568,7 @@
           <a:p>
             <a:fld id="{67760EAC-A49B-4DCF-9D84-3BBA27200B5E}" type="datetimeFigureOut">
               <a:rPr lang="en-US" smtClean="0"/>
-              <a:t>2/15/2025</a:t>
+              <a:t>2/23/2025</a:t>
             </a:fld>
             <a:endParaRPr lang="en-US"/>
           </a:p>
@@ -3013,7 +3013,7 @@
         </p:blipFill>
         <p:spPr>
           <a:xfrm rot="10800000" flipV="1">
-            <a:off x="101652" y="-1009"/>
+            <a:off x="101652" y="-470137"/>
             <a:ext cx="4500261" cy="2463387"/>
           </a:xfrm>
           <a:prstGeom prst="rect">
@@ -3035,7 +3035,7 @@
         </p:nvSpPr>
         <p:spPr>
           <a:xfrm rot="10800000" flipV="1">
-            <a:off x="549840" y="1087096"/>
+            <a:off x="549840" y="617968"/>
             <a:ext cx="788269" cy="423969"/>
           </a:xfrm>
           <a:prstGeom prst="triangle">
@@ -3095,7 +3095,7 @@
         </p:nvCxnSpPr>
         <p:spPr>
           <a:xfrm flipH="1" flipV="1">
-            <a:off x="92225" y="2139519"/>
+            <a:off x="92225" y="1670391"/>
             <a:ext cx="4110651" cy="2"/>
           </a:xfrm>
           <a:prstGeom prst="line">
@@ -3139,7 +3139,7 @@
         </p:nvCxnSpPr>
         <p:spPr>
           <a:xfrm flipH="1" flipV="1">
-            <a:off x="90064" y="1057009"/>
+            <a:off x="90064" y="587881"/>
             <a:ext cx="4110651" cy="2"/>
           </a:xfrm>
           <a:prstGeom prst="line">
@@ -3183,7 +3183,7 @@
         </p:nvCxnSpPr>
         <p:spPr>
           <a:xfrm flipH="1" flipV="1">
-            <a:off x="95366" y="1511065"/>
+            <a:off x="95366" y="1041937"/>
             <a:ext cx="4110651" cy="2"/>
           </a:xfrm>
           <a:prstGeom prst="line">
@@ -3225,7 +3225,7 @@
         </p:nvSpPr>
         <p:spPr>
           <a:xfrm rot="10800000" flipV="1">
-            <a:off x="1589659" y="1087096"/>
+            <a:off x="1589659" y="617968"/>
             <a:ext cx="788269" cy="423969"/>
           </a:xfrm>
           <a:prstGeom prst="triangle">
@@ -3283,7 +3283,7 @@
         </p:nvSpPr>
         <p:spPr>
           <a:xfrm rot="10800000" flipV="1">
-            <a:off x="2387355" y="1087096"/>
+            <a:off x="2387355" y="617968"/>
             <a:ext cx="788269" cy="423969"/>
           </a:xfrm>
           <a:prstGeom prst="triangle">
@@ -3341,7 +3341,7 @@
         </p:nvSpPr>
         <p:spPr>
           <a:xfrm rot="10800000" flipV="1">
-            <a:off x="395426" y="924068"/>
+            <a:off x="395426" y="454940"/>
             <a:ext cx="1080942" cy="581382"/>
           </a:xfrm>
           <a:prstGeom prst="triangle">
@@ -3397,7 +3397,7 @@
         </p:nvSpPr>
         <p:spPr>
           <a:xfrm rot="10800000" flipV="1">
-            <a:off x="1712011" y="1224191"/>
+            <a:off x="1712011" y="755063"/>
             <a:ext cx="522935" cy="281259"/>
           </a:xfrm>
           <a:prstGeom prst="triangle">
@@ -3479,7 +3479,7 @@
         </p:blipFill>
         <p:spPr>
           <a:xfrm rot="10800000" flipV="1">
-            <a:off x="5856594" y="1763"/>
+            <a:off x="5856594" y="-467365"/>
             <a:ext cx="4500261" cy="2463387"/>
           </a:xfrm>
           <a:prstGeom prst="rect">
@@ -3503,7 +3503,7 @@
         </p:nvCxnSpPr>
         <p:spPr>
           <a:xfrm flipH="1" flipV="1">
-            <a:off x="5847167" y="2142291"/>
+            <a:off x="5847167" y="1673163"/>
             <a:ext cx="4110651" cy="2"/>
           </a:xfrm>
           <a:prstGeom prst="line">
@@ -3547,7 +3547,7 @@
         </p:nvCxnSpPr>
         <p:spPr>
           <a:xfrm flipH="1" flipV="1">
-            <a:off x="5845006" y="1059781"/>
+            <a:off x="5845006" y="590653"/>
             <a:ext cx="4110651" cy="2"/>
           </a:xfrm>
           <a:prstGeom prst="line">
@@ -3591,7 +3591,7 @@
         </p:nvCxnSpPr>
         <p:spPr>
           <a:xfrm flipH="1" flipV="1">
-            <a:off x="5850308" y="1888797"/>
+            <a:off x="5850308" y="1419669"/>
             <a:ext cx="4110651" cy="2"/>
           </a:xfrm>
           <a:prstGeom prst="line">
@@ -3633,7 +3633,7 @@
         </p:nvSpPr>
         <p:spPr>
           <a:xfrm rot="10800000" flipV="1">
-            <a:off x="6397482" y="1089868"/>
+            <a:off x="6397482" y="620740"/>
             <a:ext cx="1485411" cy="798926"/>
           </a:xfrm>
           <a:prstGeom prst="triangle">
@@ -3691,7 +3691,7 @@
         </p:nvSpPr>
         <p:spPr>
           <a:xfrm rot="10800000" flipV="1">
-            <a:off x="8142296" y="1089868"/>
+            <a:off x="8142296" y="620740"/>
             <a:ext cx="1485410" cy="798925"/>
           </a:xfrm>
           <a:prstGeom prst="triangle">
@@ -3749,7 +3749,7 @@
         </p:nvSpPr>
         <p:spPr>
           <a:xfrm rot="10800000" flipV="1">
-            <a:off x="6164751" y="851453"/>
+            <a:off x="6164751" y="382325"/>
             <a:ext cx="1925367" cy="1035554"/>
           </a:xfrm>
           <a:prstGeom prst="triangle">
@@ -3805,7 +3805,7 @@
         </p:nvSpPr>
         <p:spPr>
           <a:xfrm rot="10800000" flipV="1">
-            <a:off x="8348573" y="1299081"/>
+            <a:off x="8348573" y="829953"/>
             <a:ext cx="1096433" cy="589713"/>
           </a:xfrm>
           <a:prstGeom prst="triangle">
@@ -3861,7 +3861,7 @@
         </p:nvSpPr>
         <p:spPr>
           <a:xfrm>
-            <a:off x="4297538" y="847422"/>
+            <a:off x="4297538" y="378294"/>
             <a:ext cx="1462000" cy="307777"/>
           </a:xfrm>
           <a:prstGeom prst="rect">
@@ -3900,7 +3900,7 @@
         </p:nvCxnSpPr>
         <p:spPr>
           <a:xfrm>
-            <a:off x="4298200" y="1056100"/>
+            <a:off x="4298200" y="586972"/>
             <a:ext cx="0" cy="506842"/>
           </a:xfrm>
           <a:prstGeom prst="straightConnector1">
@@ -3945,7 +3945,7 @@
         </p:nvCxnSpPr>
         <p:spPr>
           <a:xfrm>
-            <a:off x="5760200" y="1040017"/>
+            <a:off x="5760200" y="570889"/>
             <a:ext cx="0" cy="868680"/>
           </a:xfrm>
           <a:prstGeom prst="straightConnector1">
@@ -3990,7 +3990,7 @@
             </p:nvSpPr>
             <p:spPr>
               <a:xfrm>
-                <a:off x="4284721" y="1115446"/>
+                <a:off x="4284721" y="646318"/>
                 <a:ext cx="311486" cy="369332"/>
               </a:xfrm>
               <a:prstGeom prst="rect">
@@ -4052,7 +4052,7 @@
             </p:nvSpPr>
             <p:spPr>
               <a:xfrm>
-                <a:off x="4284721" y="1115446"/>
+                <a:off x="4284721" y="646318"/>
                 <a:ext cx="311486" cy="369332"/>
               </a:xfrm>
               <a:prstGeom prst="rect">
@@ -4096,7 +4096,7 @@
             </p:nvSpPr>
             <p:spPr>
               <a:xfrm>
-                <a:off x="5534657" y="1311803"/>
+                <a:off x="5534657" y="842675"/>
                 <a:ext cx="311486" cy="369332"/>
               </a:xfrm>
               <a:prstGeom prst="rect">
@@ -4158,7 +4158,7 @@
             </p:nvSpPr>
             <p:spPr>
               <a:xfrm>
-                <a:off x="5534657" y="1311803"/>
+                <a:off x="5534657" y="842675"/>
                 <a:ext cx="311486" cy="369332"/>
               </a:xfrm>
               <a:prstGeom prst="rect">
@@ -4202,7 +4202,7 @@
             </p:nvSpPr>
             <p:spPr>
               <a:xfrm>
-                <a:off x="4193371" y="816645"/>
+                <a:off x="4193371" y="347517"/>
                 <a:ext cx="311486" cy="369332"/>
               </a:xfrm>
               <a:prstGeom prst="rect">
@@ -4279,7 +4279,7 @@
             </p:nvSpPr>
             <p:spPr>
               <a:xfrm>
-                <a:off x="4193371" y="816645"/>
+                <a:off x="4193371" y="347517"/>
                 <a:ext cx="311486" cy="369332"/>
               </a:xfrm>
               <a:prstGeom prst="rect">
@@ -4323,7 +4323,7 @@
             </p:nvSpPr>
             <p:spPr>
               <a:xfrm>
-                <a:off x="5634749" y="816645"/>
+                <a:off x="5634749" y="347517"/>
                 <a:ext cx="307530" cy="369332"/>
               </a:xfrm>
               <a:prstGeom prst="rect">
@@ -4400,7 +4400,7 @@
             </p:nvSpPr>
             <p:spPr>
               <a:xfrm>
-                <a:off x="5634749" y="816645"/>
+                <a:off x="5634749" y="347517"/>
                 <a:ext cx="307530" cy="369332"/>
               </a:xfrm>
               <a:prstGeom prst="rect">
@@ -4442,7 +4442,7 @@
         </p:nvSpPr>
         <p:spPr>
           <a:xfrm>
-            <a:off x="4310972" y="1444488"/>
+            <a:off x="4310972" y="975360"/>
             <a:ext cx="1462000" cy="307777"/>
           </a:xfrm>
           <a:prstGeom prst="rect">
@@ -4484,7 +4484,7 @@
         </p:nvSpPr>
         <p:spPr>
           <a:xfrm>
-            <a:off x="4313271" y="1991351"/>
+            <a:off x="4313271" y="1522223"/>
             <a:ext cx="1462000" cy="307777"/>
           </a:xfrm>
           <a:prstGeom prst="rect">
@@ -4606,7 +4606,7 @@
             </p:nvSpPr>
             <p:spPr>
               <a:xfrm>
-                <a:off x="2402589" y="1570309"/>
+                <a:off x="2402589" y="1101181"/>
                 <a:ext cx="735025" cy="369332"/>
               </a:xfrm>
               <a:prstGeom prst="rect">
@@ -4686,7 +4686,7 @@
             </p:nvSpPr>
             <p:spPr>
               <a:xfrm>
-                <a:off x="2402589" y="1570309"/>
+                <a:off x="2402589" y="1101181"/>
                 <a:ext cx="735025" cy="369332"/>
               </a:xfrm>
               <a:prstGeom prst="rect">
@@ -4730,7 +4730,7 @@
         </p:nvCxnSpPr>
         <p:spPr>
           <a:xfrm rot="16200000">
-            <a:off x="2799667" y="1159598"/>
+            <a:off x="2799667" y="690470"/>
             <a:ext cx="0" cy="868680"/>
           </a:xfrm>
           <a:prstGeom prst="straightConnector1">
@@ -4759,8 +4759,8 @@
           </a:fontRef>
         </p:style>
       </p:cxnSp>
-      <mc:AlternateContent xmlns:mc="http://schemas.openxmlformats.org/markup-compatibility/2006" xmlns:a14="http://schemas.microsoft.com/office/drawing/2010/main">
-        <mc:Choice Requires="a14">
+      <mc:AlternateContent xmlns:mc="http://schemas.openxmlformats.org/markup-compatibility/2006">
+        <mc:Choice xmlns:a14="http://schemas.microsoft.com/office/drawing/2010/main" Requires="a14">
           <p:sp>
             <p:nvSpPr>
               <p:cNvPr id="14" name="TextBox 13">
@@ -4775,7 +4775,7 @@
             </p:nvSpPr>
             <p:spPr>
               <a:xfrm>
-                <a:off x="8533717" y="1947938"/>
+                <a:off x="8533717" y="1478810"/>
                 <a:ext cx="735025" cy="369332"/>
               </a:xfrm>
               <a:prstGeom prst="rect">
@@ -4838,7 +4838,7 @@
             </p:txBody>
           </p:sp>
         </mc:Choice>
-        <mc:Fallback xmlns="">
+        <mc:Fallback>
           <p:sp>
             <p:nvSpPr>
               <p:cNvPr id="14" name="TextBox 13">
@@ -4855,7 +4855,7 @@
             </p:nvSpPr>
             <p:spPr>
               <a:xfrm>
-                <a:off x="8533717" y="1947938"/>
+                <a:off x="8533717" y="1478810"/>
                 <a:ext cx="735025" cy="369332"/>
               </a:xfrm>
               <a:prstGeom prst="rect">
@@ -4899,7 +4899,7 @@
         </p:nvCxnSpPr>
         <p:spPr>
           <a:xfrm flipV="1">
-            <a:off x="8141216" y="1991351"/>
+            <a:off x="8141216" y="1522223"/>
             <a:ext cx="1542214" cy="6528"/>
           </a:xfrm>
           <a:prstGeom prst="straightConnector1">
@@ -4942,7 +4942,7 @@
         </p:nvSpPr>
         <p:spPr>
           <a:xfrm>
-            <a:off x="874929" y="856173"/>
+            <a:off x="874929" y="387045"/>
             <a:ext cx="131569" cy="117958"/>
           </a:xfrm>
           <a:prstGeom prst="star5">
@@ -4996,7 +4996,7 @@
         </p:nvSpPr>
         <p:spPr>
           <a:xfrm>
-            <a:off x="1906355" y="1174478"/>
+            <a:off x="1906355" y="705350"/>
             <a:ext cx="131569" cy="117958"/>
           </a:xfrm>
           <a:prstGeom prst="star5">
@@ -5050,7 +5050,7 @@
         </p:nvSpPr>
         <p:spPr>
           <a:xfrm>
-            <a:off x="7061649" y="757666"/>
+            <a:off x="7061649" y="288538"/>
             <a:ext cx="131569" cy="117958"/>
           </a:xfrm>
           <a:prstGeom prst="star5">
@@ -5104,7 +5104,7 @@
         </p:nvSpPr>
         <p:spPr>
           <a:xfrm>
-            <a:off x="8825534" y="1214759"/>
+            <a:off x="8825534" y="745631"/>
             <a:ext cx="131569" cy="117958"/>
           </a:xfrm>
           <a:prstGeom prst="star5">
@@ -5160,7 +5160,7 @@
         </p:nvCxnSpPr>
         <p:spPr>
           <a:xfrm>
-            <a:off x="5965229" y="673595"/>
+            <a:off x="5965229" y="204467"/>
             <a:ext cx="0" cy="678798"/>
           </a:xfrm>
           <a:prstGeom prst="straightConnector1">
@@ -5189,8 +5189,8 @@
           </a:fontRef>
         </p:style>
       </p:cxnSp>
-      <mc:AlternateContent xmlns:mc="http://schemas.openxmlformats.org/markup-compatibility/2006" xmlns:a14="http://schemas.microsoft.com/office/drawing/2010/main">
-        <mc:Choice Requires="a14">
+      <mc:AlternateContent xmlns:mc="http://schemas.openxmlformats.org/markup-compatibility/2006">
+        <mc:Choice xmlns:a14="http://schemas.microsoft.com/office/drawing/2010/main" Requires="a14">
           <p:sp>
             <p:nvSpPr>
               <p:cNvPr id="42" name="TextBox 41">
@@ -5205,7 +5205,7 @@
             </p:nvSpPr>
             <p:spPr>
               <a:xfrm rot="16200000">
-                <a:off x="5743247" y="886128"/>
+                <a:off x="5743247" y="353392"/>
                 <a:ext cx="735025" cy="307777"/>
               </a:xfrm>
               <a:prstGeom prst="rect">
@@ -5250,7 +5250,7 @@
             </p:txBody>
           </p:sp>
         </mc:Choice>
-        <mc:Fallback xmlns="">
+        <mc:Fallback>
           <p:sp>
             <p:nvSpPr>
               <p:cNvPr id="42" name="TextBox 41">
@@ -5267,7 +5267,7 @@
             </p:nvSpPr>
             <p:spPr>
               <a:xfrm rot="16200000">
-                <a:off x="5743247" y="886128"/>
+                <a:off x="5743247" y="353392"/>
                 <a:ext cx="735025" cy="307777"/>
               </a:xfrm>
               <a:prstGeom prst="rect">
@@ -5311,7 +5311,7 @@
         </p:nvCxnSpPr>
         <p:spPr>
           <a:xfrm>
-            <a:off x="4091476" y="869046"/>
+            <a:off x="4091476" y="399918"/>
             <a:ext cx="0" cy="355061"/>
           </a:xfrm>
           <a:prstGeom prst="straightConnector1">
@@ -5356,7 +5356,7 @@
             </p:nvSpPr>
             <p:spPr>
               <a:xfrm rot="16200000">
-                <a:off x="3573463" y="860914"/>
+                <a:off x="3573463" y="367933"/>
                 <a:ext cx="735025" cy="307777"/>
               </a:xfrm>
               <a:prstGeom prst="rect">
@@ -5418,14 +5418,14 @@
             </p:nvSpPr>
             <p:spPr>
               <a:xfrm rot="16200000">
-                <a:off x="3573463" y="860914"/>
+                <a:off x="3573463" y="367933"/>
                 <a:ext cx="735025" cy="307777"/>
               </a:xfrm>
               <a:prstGeom prst="rect">
                 <a:avLst/>
               </a:prstGeom>
               <a:blipFill>
-                <a:blip r:embed="rId10"/>
+                <a:blip r:embed="rId11"/>
                 <a:stretch>
                   <a:fillRect/>
                 </a:stretch>
@@ -5446,6 +5446,270 @@
           </p:sp>
         </mc:Fallback>
       </mc:AlternateContent>
+      <p:grpSp>
+        <p:nvGrpSpPr>
+          <p:cNvPr id="41" name="Group 40">
+            <a:extLst>
+              <a:ext uri="{FF2B5EF4-FFF2-40B4-BE49-F238E27FC236}">
+                <a16:creationId xmlns:a16="http://schemas.microsoft.com/office/drawing/2014/main" id="{B368C514-9039-0C6D-2108-FA26515EC4A5}"/>
+              </a:ext>
+            </a:extLst>
+          </p:cNvPr>
+          <p:cNvGrpSpPr/>
+          <p:nvPr/>
+        </p:nvGrpSpPr>
+        <p:grpSpPr>
+          <a:xfrm>
+            <a:off x="5759538" y="1968680"/>
+            <a:ext cx="4298862" cy="402432"/>
+            <a:chOff x="5722431" y="1968680"/>
+            <a:chExt cx="4417280" cy="402432"/>
+          </a:xfrm>
+        </p:grpSpPr>
+        <p:sp>
+          <p:nvSpPr>
+            <p:cNvPr id="4" name="Oval 3">
+              <a:extLst>
+                <a:ext uri="{FF2B5EF4-FFF2-40B4-BE49-F238E27FC236}">
+                  <a16:creationId xmlns:a16="http://schemas.microsoft.com/office/drawing/2014/main" id="{8255AC0D-DB09-B1C5-1483-F95923035DB3}"/>
+                </a:ext>
+              </a:extLst>
+            </p:cNvPr>
+            <p:cNvSpPr/>
+            <p:nvPr/>
+          </p:nvSpPr>
+          <p:spPr>
+            <a:xfrm rot="5400000">
+              <a:off x="7729855" y="-38744"/>
+              <a:ext cx="402432" cy="4417280"/>
+            </a:xfrm>
+            <a:prstGeom prst="ellipse">
+              <a:avLst/>
+            </a:prstGeom>
+            <a:solidFill>
+              <a:schemeClr val="accent6">
+                <a:lumMod val="20000"/>
+                <a:lumOff val="80000"/>
+              </a:schemeClr>
+            </a:solidFill>
+            <a:ln w="38100" cap="flat" cmpd="sng" algn="ctr">
+              <a:solidFill>
+                <a:schemeClr val="tx1"/>
+              </a:solidFill>
+              <a:prstDash val="solid"/>
+            </a:ln>
+            <a:effectLst/>
+          </p:spPr>
+          <p:txBody>
+            <a:bodyPr rtlCol="0" anchor="ctr"/>
+            <a:lstStyle/>
+            <a:p>
+              <a:pPr marL="0" marR="0" lvl="0" indent="0" algn="ctr" defTabSz="914400" eaLnBrk="1" fontAlgn="base" latinLnBrk="0" hangingPunct="1">
+                <a:lnSpc>
+                  <a:spcPct val="100000"/>
+                </a:lnSpc>
+                <a:spcBef>
+                  <a:spcPct val="0"/>
+                </a:spcBef>
+                <a:spcAft>
+                  <a:spcPct val="0"/>
+                </a:spcAft>
+                <a:buClrTx/>
+                <a:buSzTx/>
+                <a:buFontTx/>
+                <a:buNone/>
+                <a:tabLst/>
+                <a:defRPr/>
+              </a:pPr>
+              <a:endParaRPr kumimoji="0" lang="en-US" sz="1800" b="0" i="0" u="none" strike="noStrike" kern="0" cap="none" spc="0" normalizeH="0" baseline="0" noProof="0">
+                <a:ln>
+                  <a:noFill/>
+                </a:ln>
+                <a:solidFill>
+                  <a:prstClr val="white"/>
+                </a:solidFill>
+                <a:effectLst/>
+                <a:uLnTx/>
+                <a:uFillTx/>
+                <a:latin typeface="Calibri"/>
+                <a:ea typeface="+mn-ea"/>
+                <a:cs typeface="+mn-cs"/>
+              </a:endParaRPr>
+            </a:p>
+          </p:txBody>
+        </p:sp>
+        <p:sp>
+          <p:nvSpPr>
+            <p:cNvPr id="40" name="TextBox 39">
+              <a:extLst>
+                <a:ext uri="{FF2B5EF4-FFF2-40B4-BE49-F238E27FC236}">
+                  <a16:creationId xmlns:a16="http://schemas.microsoft.com/office/drawing/2014/main" id="{74C8B003-6C33-82D7-8F8B-A7015A6D9563}"/>
+                </a:ext>
+              </a:extLst>
+            </p:cNvPr>
+            <p:cNvSpPr txBox="1"/>
+            <p:nvPr/>
+          </p:nvSpPr>
+          <p:spPr>
+            <a:xfrm>
+              <a:off x="6098209" y="2020154"/>
+              <a:ext cx="3665724" cy="338554"/>
+            </a:xfrm>
+            <a:prstGeom prst="rect">
+              <a:avLst/>
+            </a:prstGeom>
+            <a:noFill/>
+          </p:spPr>
+          <p:txBody>
+            <a:bodyPr wrap="square" rtlCol="0">
+              <a:spAutoFit/>
+            </a:bodyPr>
+            <a:lstStyle/>
+            <a:p>
+              <a:pPr algn="ctr"/>
+              <a:r>
+                <a:rPr lang="en-US" sz="1600" b="1" dirty="0">
+                  <a:latin typeface="Times New Roman" panose="02020603050405020304" pitchFamily="18" charset="0"/>
+                  <a:cs typeface="Times New Roman" panose="02020603050405020304" pitchFamily="18" charset="0"/>
+                </a:rPr>
+                <a:t>Objective</a:t>
+              </a:r>
+            </a:p>
+          </p:txBody>
+        </p:sp>
+      </p:grpSp>
+      <p:grpSp>
+        <p:nvGrpSpPr>
+          <p:cNvPr id="48" name="Group 47">
+            <a:extLst>
+              <a:ext uri="{FF2B5EF4-FFF2-40B4-BE49-F238E27FC236}">
+                <a16:creationId xmlns:a16="http://schemas.microsoft.com/office/drawing/2014/main" id="{21081E8C-5F02-5D8F-15D0-CDD95E0D5848}"/>
+              </a:ext>
+            </a:extLst>
+          </p:cNvPr>
+          <p:cNvGrpSpPr/>
+          <p:nvPr/>
+        </p:nvGrpSpPr>
+        <p:grpSpPr>
+          <a:xfrm>
+            <a:off x="-1" y="1968680"/>
+            <a:ext cx="4284722" cy="402432"/>
+            <a:chOff x="5722431" y="1968680"/>
+            <a:chExt cx="4417280" cy="402432"/>
+          </a:xfrm>
+        </p:grpSpPr>
+        <p:sp>
+          <p:nvSpPr>
+            <p:cNvPr id="49" name="Oval 48">
+              <a:extLst>
+                <a:ext uri="{FF2B5EF4-FFF2-40B4-BE49-F238E27FC236}">
+                  <a16:creationId xmlns:a16="http://schemas.microsoft.com/office/drawing/2014/main" id="{E61F34E3-05CC-7426-7BA8-2FC9152D1B63}"/>
+                </a:ext>
+              </a:extLst>
+            </p:cNvPr>
+            <p:cNvSpPr/>
+            <p:nvPr/>
+          </p:nvSpPr>
+          <p:spPr>
+            <a:xfrm rot="5400000">
+              <a:off x="7729855" y="-38744"/>
+              <a:ext cx="402432" cy="4417280"/>
+            </a:xfrm>
+            <a:prstGeom prst="ellipse">
+              <a:avLst/>
+            </a:prstGeom>
+            <a:solidFill>
+              <a:schemeClr val="accent6">
+                <a:lumMod val="20000"/>
+                <a:lumOff val="80000"/>
+              </a:schemeClr>
+            </a:solidFill>
+            <a:ln w="38100" cap="flat" cmpd="sng" algn="ctr">
+              <a:solidFill>
+                <a:schemeClr val="tx1"/>
+              </a:solidFill>
+              <a:prstDash val="solid"/>
+            </a:ln>
+            <a:effectLst/>
+          </p:spPr>
+          <p:txBody>
+            <a:bodyPr rtlCol="0" anchor="ctr"/>
+            <a:lstStyle/>
+            <a:p>
+              <a:pPr marL="0" marR="0" lvl="0" indent="0" algn="ctr" defTabSz="914400" eaLnBrk="1" fontAlgn="base" latinLnBrk="0" hangingPunct="1">
+                <a:lnSpc>
+                  <a:spcPct val="100000"/>
+                </a:lnSpc>
+                <a:spcBef>
+                  <a:spcPct val="0"/>
+                </a:spcBef>
+                <a:spcAft>
+                  <a:spcPct val="0"/>
+                </a:spcAft>
+                <a:buClrTx/>
+                <a:buSzTx/>
+                <a:buFontTx/>
+                <a:buNone/>
+                <a:tabLst/>
+                <a:defRPr/>
+              </a:pPr>
+              <a:endParaRPr kumimoji="0" lang="en-US" sz="1800" b="0" i="0" u="none" strike="noStrike" kern="0" cap="none" spc="0" normalizeH="0" baseline="0" noProof="0">
+                <a:ln>
+                  <a:noFill/>
+                </a:ln>
+                <a:solidFill>
+                  <a:prstClr val="white"/>
+                </a:solidFill>
+                <a:effectLst/>
+                <a:uLnTx/>
+                <a:uFillTx/>
+                <a:latin typeface="Calibri"/>
+                <a:ea typeface="+mn-ea"/>
+                <a:cs typeface="+mn-cs"/>
+              </a:endParaRPr>
+            </a:p>
+          </p:txBody>
+        </p:sp>
+        <p:sp>
+          <p:nvSpPr>
+            <p:cNvPr id="50" name="TextBox 49">
+              <a:extLst>
+                <a:ext uri="{FF2B5EF4-FFF2-40B4-BE49-F238E27FC236}">
+                  <a16:creationId xmlns:a16="http://schemas.microsoft.com/office/drawing/2014/main" id="{41129E76-B9F6-4102-487D-52BB99AAF1AC}"/>
+                </a:ext>
+              </a:extLst>
+            </p:cNvPr>
+            <p:cNvSpPr txBox="1"/>
+            <p:nvPr/>
+          </p:nvSpPr>
+          <p:spPr>
+            <a:xfrm>
+              <a:off x="6098209" y="2020154"/>
+              <a:ext cx="3665724" cy="338554"/>
+            </a:xfrm>
+            <a:prstGeom prst="rect">
+              <a:avLst/>
+            </a:prstGeom>
+            <a:noFill/>
+          </p:spPr>
+          <p:txBody>
+            <a:bodyPr wrap="square" rtlCol="0">
+              <a:spAutoFit/>
+            </a:bodyPr>
+            <a:lstStyle/>
+            <a:p>
+              <a:pPr algn="ctr"/>
+              <a:r>
+                <a:rPr lang="en-US" sz="1600" b="1" dirty="0">
+                  <a:latin typeface="Times New Roman" panose="02020603050405020304" pitchFamily="18" charset="0"/>
+                  <a:cs typeface="Times New Roman" panose="02020603050405020304" pitchFamily="18" charset="0"/>
+                </a:rPr>
+                <a:t>Objective</a:t>
+              </a:r>
+            </a:p>
+          </p:txBody>
+        </p:sp>
+      </p:grpSp>
     </p:spTree>
     <p:extLst>
       <p:ext uri="{BB962C8B-B14F-4D97-AF65-F5344CB8AC3E}">

</xml_diff>